<commit_message>
docs: Amend Intelligent Assistant proposal presentation to documentation folder
</commit_message>
<xml_diff>
--- a/doc/Intelligent_Assistant_Proposal.pptx
+++ b/doc/Intelligent_Assistant_Proposal.pptx
@@ -6836,7 +6836,7 @@
             </a:pPr>
             <a:r>
               <a:rPr lang="en-SG" sz="800" b="1" dirty="0"/>
-              <a:t>Download model from Cloud</a:t>
+              <a:t>Download model from Cloud using https</a:t>
             </a:r>
           </a:p>
           <a:p>
@@ -6845,8 +6845,13 @@
             </a:pPr>
             <a:r>
               <a:rPr lang="en-SG" sz="800" b="1" dirty="0"/>
-              <a:t>Download Rules from Cloud</a:t>
-            </a:r>
+              <a:t>Download Rules </a:t>
+            </a:r>
+            <a:r>
+              <a:rPr lang="en-SG" sz="800" b="1"/>
+              <a:t>from Cloud using https</a:t>
+            </a:r>
+            <a:endParaRPr lang="en-SG" sz="800" b="1" dirty="0"/>
           </a:p>
           <a:p>
             <a:pPr marL="914400" lvl="2" indent="0">
@@ -7575,6 +7580,76 @@
           </a:fontRef>
         </p:style>
       </p:cxnSp>
+      <p:sp>
+        <p:nvSpPr>
+          <p:cNvPr id="40" name="TextBox 39">
+            <a:extLst>
+              <a:ext uri="{FF2B5EF4-FFF2-40B4-BE49-F238E27FC236}">
+                <a16:creationId xmlns:a16="http://schemas.microsoft.com/office/drawing/2014/main" id="{7AFD7276-CBEC-81A5-34F6-17C02A7DCE46}"/>
+              </a:ext>
+            </a:extLst>
+          </p:cNvPr>
+          <p:cNvSpPr txBox="1"/>
+          <p:nvPr/>
+        </p:nvSpPr>
+        <p:spPr>
+          <a:xfrm>
+            <a:off x="5108954" y="5658875"/>
+            <a:ext cx="963561" cy="276999"/>
+          </a:xfrm>
+          <a:prstGeom prst="rect">
+            <a:avLst/>
+          </a:prstGeom>
+          <a:noFill/>
+        </p:spPr>
+        <p:txBody>
+          <a:bodyPr wrap="square" rtlCol="0">
+            <a:spAutoFit/>
+          </a:bodyPr>
+          <a:lstStyle/>
+          <a:p>
+            <a:r>
+              <a:rPr lang="en-SG" sz="1200" dirty="0"/>
+              <a:t>Model</a:t>
+            </a:r>
+          </a:p>
+        </p:txBody>
+      </p:sp>
+      <p:sp>
+        <p:nvSpPr>
+          <p:cNvPr id="41" name="TextBox 40">
+            <a:extLst>
+              <a:ext uri="{FF2B5EF4-FFF2-40B4-BE49-F238E27FC236}">
+                <a16:creationId xmlns:a16="http://schemas.microsoft.com/office/drawing/2014/main" id="{1635B0F7-6292-E860-FA9F-7BBAAE423097}"/>
+              </a:ext>
+            </a:extLst>
+          </p:cNvPr>
+          <p:cNvSpPr txBox="1"/>
+          <p:nvPr/>
+        </p:nvSpPr>
+        <p:spPr>
+          <a:xfrm>
+            <a:off x="5108954" y="3279040"/>
+            <a:ext cx="963561" cy="276999"/>
+          </a:xfrm>
+          <a:prstGeom prst="rect">
+            <a:avLst/>
+          </a:prstGeom>
+          <a:noFill/>
+        </p:spPr>
+        <p:txBody>
+          <a:bodyPr wrap="square" rtlCol="0">
+            <a:spAutoFit/>
+          </a:bodyPr>
+          <a:lstStyle/>
+          <a:p>
+            <a:r>
+              <a:rPr lang="en-SG" sz="1200" dirty="0"/>
+              <a:t>Model</a:t>
+            </a:r>
+          </a:p>
+        </p:txBody>
+      </p:sp>
     </p:spTree>
     <p:extLst>
       <p:ext uri="{BB962C8B-B14F-4D97-AF65-F5344CB8AC3E}">
@@ -7585,6 +7660,115 @@
   <p:clrMapOvr>
     <a:masterClrMapping/>
   </p:clrMapOvr>
+  <p:timing>
+    <p:tnLst>
+      <p:par>
+        <p:cTn id="1" dur="indefinite" restart="never" nodeType="tmRoot">
+          <p:childTnLst>
+            <p:seq concurrent="1" nextAc="seek">
+              <p:cTn id="2" dur="indefinite" nodeType="mainSeq">
+                <p:childTnLst>
+                  <p:par>
+                    <p:cTn id="3" fill="hold">
+                      <p:stCondLst>
+                        <p:cond delay="indefinite"/>
+                        <p:cond evt="onBegin" delay="0">
+                          <p:tn val="2"/>
+                        </p:cond>
+                      </p:stCondLst>
+                      <p:childTnLst>
+                        <p:par>
+                          <p:cTn id="4" fill="hold">
+                            <p:stCondLst>
+                              <p:cond delay="0"/>
+                            </p:stCondLst>
+                            <p:childTnLst>
+                              <p:par>
+                                <p:cTn id="5" presetID="1" presetClass="entr" presetSubtype="0" fill="hold" grpId="0" nodeType="withEffect">
+                                  <p:stCondLst>
+                                    <p:cond delay="0"/>
+                                  </p:stCondLst>
+                                  <p:childTnLst>
+                                    <p:set>
+                                      <p:cBhvr>
+                                        <p:cTn id="6" dur="1" fill="hold">
+                                          <p:stCondLst>
+                                            <p:cond delay="0"/>
+                                          </p:stCondLst>
+                                        </p:cTn>
+                                        <p:tgtEl>
+                                          <p:spTgt spid="40"/>
+                                        </p:tgtEl>
+                                        <p:attrNameLst>
+                                          <p:attrName>style.visibility</p:attrName>
+                                        </p:attrNameLst>
+                                      </p:cBhvr>
+                                      <p:to>
+                                        <p:strVal val="visible"/>
+                                      </p:to>
+                                    </p:set>
+                                  </p:childTnLst>
+                                </p:cTn>
+                              </p:par>
+                              <p:par>
+                                <p:cTn id="7" presetID="1" presetClass="entr" presetSubtype="0" fill="hold" grpId="0" nodeType="withEffect">
+                                  <p:stCondLst>
+                                    <p:cond delay="0"/>
+                                  </p:stCondLst>
+                                  <p:childTnLst>
+                                    <p:set>
+                                      <p:cBhvr>
+                                        <p:cTn id="8" dur="1" fill="hold">
+                                          <p:stCondLst>
+                                            <p:cond delay="0"/>
+                                          </p:stCondLst>
+                                        </p:cTn>
+                                        <p:tgtEl>
+                                          <p:spTgt spid="41"/>
+                                        </p:tgtEl>
+                                        <p:attrNameLst>
+                                          <p:attrName>style.visibility</p:attrName>
+                                        </p:attrNameLst>
+                                      </p:cBhvr>
+                                      <p:to>
+                                        <p:strVal val="visible"/>
+                                      </p:to>
+                                    </p:set>
+                                  </p:childTnLst>
+                                </p:cTn>
+                              </p:par>
+                            </p:childTnLst>
+                          </p:cTn>
+                        </p:par>
+                      </p:childTnLst>
+                    </p:cTn>
+                  </p:par>
+                </p:childTnLst>
+              </p:cTn>
+              <p:prevCondLst>
+                <p:cond evt="onPrev" delay="0">
+                  <p:tgtEl>
+                    <p:sldTgt/>
+                  </p:tgtEl>
+                </p:cond>
+              </p:prevCondLst>
+              <p:nextCondLst>
+                <p:cond evt="onNext" delay="0">
+                  <p:tgtEl>
+                    <p:sldTgt/>
+                  </p:tgtEl>
+                </p:cond>
+              </p:nextCondLst>
+            </p:seq>
+          </p:childTnLst>
+        </p:cTn>
+      </p:par>
+    </p:tnLst>
+    <p:bldLst>
+      <p:bldP spid="40" grpId="0"/>
+      <p:bldP spid="41" grpId="0"/>
+    </p:bldLst>
+  </p:timing>
 </p:sld>
 </file>
 
@@ -9559,6 +9743,41 @@
             <a:r>
               <a:rPr lang="en-SG" sz="1200" dirty="0"/>
               <a:t>User Interaction</a:t>
+            </a:r>
+          </a:p>
+        </p:txBody>
+      </p:sp>
+      <p:sp>
+        <p:nvSpPr>
+          <p:cNvPr id="35" name="TextBox 34">
+            <a:extLst>
+              <a:ext uri="{FF2B5EF4-FFF2-40B4-BE49-F238E27FC236}">
+                <a16:creationId xmlns:a16="http://schemas.microsoft.com/office/drawing/2014/main" id="{D907ECF4-B38A-3FDA-335C-88CAD0359737}"/>
+              </a:ext>
+            </a:extLst>
+          </p:cNvPr>
+          <p:cNvSpPr txBox="1"/>
+          <p:nvPr/>
+        </p:nvSpPr>
+        <p:spPr>
+          <a:xfrm>
+            <a:off x="5039089" y="5690567"/>
+            <a:ext cx="963561" cy="276999"/>
+          </a:xfrm>
+          <a:prstGeom prst="rect">
+            <a:avLst/>
+          </a:prstGeom>
+          <a:noFill/>
+        </p:spPr>
+        <p:txBody>
+          <a:bodyPr wrap="square" rtlCol="0">
+            <a:spAutoFit/>
+          </a:bodyPr>
+          <a:lstStyle/>
+          <a:p>
+            <a:r>
+              <a:rPr lang="en-SG" sz="1200" dirty="0"/>
+              <a:t>Model</a:t>
             </a:r>
           </a:p>
         </p:txBody>

</xml_diff>